<commit_message>
Après Séance du 12/01/18
</commit_message>
<xml_diff>
--- a/Nathan CHEVALIER/Documents techniques et datasheet/Visuels et schémas/Schémas.pptx
+++ b/Nathan CHEVALIER/Documents techniques et datasheet/Visuels et schémas/Schémas.pptx
@@ -121,6 +121,10 @@
 </p:presentation>
 </file>
 
+<file path=ppt/revisionInfo.xml><?xml version="1.0" encoding="utf-8"?>
+<p1510:revInfo xmlns:a="http://schemas.openxmlformats.org/drawingml/2006/main" xmlns:r="http://schemas.openxmlformats.org/officeDocument/2006/relationships" xmlns:p1510="http://schemas.microsoft.com/office/powerpoint/2015/10/main"/>
+</file>
+
 <file path=ppt/slideLayouts/slideLayout1.xml><?xml version="1.0" encoding="utf-8"?>
 <p:sldLayout xmlns:a="http://schemas.openxmlformats.org/drawingml/2006/main" xmlns:r="http://schemas.openxmlformats.org/officeDocument/2006/relationships" xmlns:p="http://schemas.openxmlformats.org/presentationml/2006/main" type="title" preserve="1">
   <p:cSld name="Diapositive de titre">
@@ -163,10 +167,9 @@
           </a:lstStyle>
           <a:p>
             <a:r>
-              <a:rPr lang="fr-FR" smtClean="0"/>
+              <a:rPr lang="fr-FR"/>
               <a:t>Modifiez le style du titre</a:t>
             </a:r>
-            <a:endParaRPr lang="fr-FR"/>
           </a:p>
         </p:txBody>
       </p:sp>
@@ -228,10 +231,9 @@
           </a:lstStyle>
           <a:p>
             <a:r>
-              <a:rPr lang="fr-FR" smtClean="0"/>
+              <a:rPr lang="fr-FR"/>
               <a:t>Modifiez le style des sous-titres du masque</a:t>
             </a:r>
-            <a:endParaRPr lang="fr-FR"/>
           </a:p>
         </p:txBody>
       </p:sp>
@@ -252,7 +254,7 @@
           <a:p>
             <a:fld id="{951B5795-1CCE-4E86-9492-57076AD25B1D}" type="datetimeFigureOut">
               <a:rPr lang="fr-FR" smtClean="0"/>
-              <a:t>08/12/2017</a:t>
+              <a:t>12/01/2018</a:t>
             </a:fld>
             <a:endParaRPr lang="fr-FR"/>
           </a:p>
@@ -346,10 +348,9 @@
           <a:lstStyle/>
           <a:p>
             <a:r>
-              <a:rPr lang="fr-FR" smtClean="0"/>
+              <a:rPr lang="fr-FR"/>
               <a:t>Modifiez le style du titre</a:t>
             </a:r>
-            <a:endParaRPr lang="fr-FR"/>
           </a:p>
         </p:txBody>
       </p:sp>
@@ -370,38 +371,37 @@
           <a:p>
             <a:pPr lvl="0"/>
             <a:r>
-              <a:rPr lang="fr-FR" smtClean="0"/>
+              <a:rPr lang="fr-FR"/>
               <a:t>Modifiez les styles du texte du masque</a:t>
             </a:r>
           </a:p>
           <a:p>
             <a:pPr lvl="1"/>
             <a:r>
-              <a:rPr lang="fr-FR" smtClean="0"/>
+              <a:rPr lang="fr-FR"/>
               <a:t>Deuxième niveau</a:t>
             </a:r>
           </a:p>
           <a:p>
             <a:pPr lvl="2"/>
             <a:r>
-              <a:rPr lang="fr-FR" smtClean="0"/>
+              <a:rPr lang="fr-FR"/>
               <a:t>Troisième niveau</a:t>
             </a:r>
           </a:p>
           <a:p>
             <a:pPr lvl="3"/>
             <a:r>
-              <a:rPr lang="fr-FR" smtClean="0"/>
+              <a:rPr lang="fr-FR"/>
               <a:t>Quatrième niveau</a:t>
             </a:r>
           </a:p>
           <a:p>
             <a:pPr lvl="4"/>
             <a:r>
-              <a:rPr lang="fr-FR" smtClean="0"/>
+              <a:rPr lang="fr-FR"/>
               <a:t>Cinquième niveau</a:t>
             </a:r>
-            <a:endParaRPr lang="fr-FR"/>
           </a:p>
         </p:txBody>
       </p:sp>
@@ -422,7 +422,7 @@
           <a:p>
             <a:fld id="{951B5795-1CCE-4E86-9492-57076AD25B1D}" type="datetimeFigureOut">
               <a:rPr lang="fr-FR" smtClean="0"/>
-              <a:t>08/12/2017</a:t>
+              <a:t>12/01/2018</a:t>
             </a:fld>
             <a:endParaRPr lang="fr-FR"/>
           </a:p>
@@ -521,10 +521,9 @@
           <a:lstStyle/>
           <a:p>
             <a:r>
-              <a:rPr lang="fr-FR" smtClean="0"/>
+              <a:rPr lang="fr-FR"/>
               <a:t>Modifiez le style du titre</a:t>
             </a:r>
-            <a:endParaRPr lang="fr-FR"/>
           </a:p>
         </p:txBody>
       </p:sp>
@@ -550,38 +549,37 @@
           <a:p>
             <a:pPr lvl="0"/>
             <a:r>
-              <a:rPr lang="fr-FR" smtClean="0"/>
+              <a:rPr lang="fr-FR"/>
               <a:t>Modifiez les styles du texte du masque</a:t>
             </a:r>
           </a:p>
           <a:p>
             <a:pPr lvl="1"/>
             <a:r>
-              <a:rPr lang="fr-FR" smtClean="0"/>
+              <a:rPr lang="fr-FR"/>
               <a:t>Deuxième niveau</a:t>
             </a:r>
           </a:p>
           <a:p>
             <a:pPr lvl="2"/>
             <a:r>
-              <a:rPr lang="fr-FR" smtClean="0"/>
+              <a:rPr lang="fr-FR"/>
               <a:t>Troisième niveau</a:t>
             </a:r>
           </a:p>
           <a:p>
             <a:pPr lvl="3"/>
             <a:r>
-              <a:rPr lang="fr-FR" smtClean="0"/>
+              <a:rPr lang="fr-FR"/>
               <a:t>Quatrième niveau</a:t>
             </a:r>
           </a:p>
           <a:p>
             <a:pPr lvl="4"/>
             <a:r>
-              <a:rPr lang="fr-FR" smtClean="0"/>
+              <a:rPr lang="fr-FR"/>
               <a:t>Cinquième niveau</a:t>
             </a:r>
-            <a:endParaRPr lang="fr-FR"/>
           </a:p>
         </p:txBody>
       </p:sp>
@@ -602,7 +600,7 @@
           <a:p>
             <a:fld id="{951B5795-1CCE-4E86-9492-57076AD25B1D}" type="datetimeFigureOut">
               <a:rPr lang="fr-FR" smtClean="0"/>
-              <a:t>08/12/2017</a:t>
+              <a:t>12/01/2018</a:t>
             </a:fld>
             <a:endParaRPr lang="fr-FR"/>
           </a:p>
@@ -696,10 +694,9 @@
           <a:lstStyle/>
           <a:p>
             <a:r>
-              <a:rPr lang="fr-FR" smtClean="0"/>
+              <a:rPr lang="fr-FR"/>
               <a:t>Modifiez le style du titre</a:t>
             </a:r>
-            <a:endParaRPr lang="fr-FR"/>
           </a:p>
         </p:txBody>
       </p:sp>
@@ -720,38 +717,37 @@
           <a:p>
             <a:pPr lvl="0"/>
             <a:r>
-              <a:rPr lang="fr-FR" smtClean="0"/>
+              <a:rPr lang="fr-FR"/>
               <a:t>Modifiez les styles du texte du masque</a:t>
             </a:r>
           </a:p>
           <a:p>
             <a:pPr lvl="1"/>
             <a:r>
-              <a:rPr lang="fr-FR" smtClean="0"/>
+              <a:rPr lang="fr-FR"/>
               <a:t>Deuxième niveau</a:t>
             </a:r>
           </a:p>
           <a:p>
             <a:pPr lvl="2"/>
             <a:r>
-              <a:rPr lang="fr-FR" smtClean="0"/>
+              <a:rPr lang="fr-FR"/>
               <a:t>Troisième niveau</a:t>
             </a:r>
           </a:p>
           <a:p>
             <a:pPr lvl="3"/>
             <a:r>
-              <a:rPr lang="fr-FR" smtClean="0"/>
+              <a:rPr lang="fr-FR"/>
               <a:t>Quatrième niveau</a:t>
             </a:r>
           </a:p>
           <a:p>
             <a:pPr lvl="4"/>
             <a:r>
-              <a:rPr lang="fr-FR" smtClean="0"/>
+              <a:rPr lang="fr-FR"/>
               <a:t>Cinquième niveau</a:t>
             </a:r>
-            <a:endParaRPr lang="fr-FR"/>
           </a:p>
         </p:txBody>
       </p:sp>
@@ -772,7 +768,7 @@
           <a:p>
             <a:fld id="{951B5795-1CCE-4E86-9492-57076AD25B1D}" type="datetimeFigureOut">
               <a:rPr lang="fr-FR" smtClean="0"/>
-              <a:t>08/12/2017</a:t>
+              <a:t>12/01/2018</a:t>
             </a:fld>
             <a:endParaRPr lang="fr-FR"/>
           </a:p>
@@ -875,10 +871,9 @@
           </a:lstStyle>
           <a:p>
             <a:r>
-              <a:rPr lang="fr-FR" smtClean="0"/>
+              <a:rPr lang="fr-FR"/>
               <a:t>Modifiez le style du titre</a:t>
             </a:r>
-            <a:endParaRPr lang="fr-FR"/>
           </a:p>
         </p:txBody>
       </p:sp>
@@ -995,7 +990,7 @@
           <a:p>
             <a:pPr lvl="0"/>
             <a:r>
-              <a:rPr lang="fr-FR" smtClean="0"/>
+              <a:rPr lang="fr-FR"/>
               <a:t>Modifiez les styles du texte du masque</a:t>
             </a:r>
           </a:p>
@@ -1018,7 +1013,7 @@
           <a:p>
             <a:fld id="{951B5795-1CCE-4E86-9492-57076AD25B1D}" type="datetimeFigureOut">
               <a:rPr lang="fr-FR" smtClean="0"/>
-              <a:t>08/12/2017</a:t>
+              <a:t>12/01/2018</a:t>
             </a:fld>
             <a:endParaRPr lang="fr-FR"/>
           </a:p>
@@ -1112,10 +1107,9 @@
           <a:lstStyle/>
           <a:p>
             <a:r>
-              <a:rPr lang="fr-FR" smtClean="0"/>
+              <a:rPr lang="fr-FR"/>
               <a:t>Modifiez le style du titre</a:t>
             </a:r>
-            <a:endParaRPr lang="fr-FR"/>
           </a:p>
         </p:txBody>
       </p:sp>
@@ -1141,38 +1135,37 @@
           <a:p>
             <a:pPr lvl="0"/>
             <a:r>
-              <a:rPr lang="fr-FR" smtClean="0"/>
+              <a:rPr lang="fr-FR"/>
               <a:t>Modifiez les styles du texte du masque</a:t>
             </a:r>
           </a:p>
           <a:p>
             <a:pPr lvl="1"/>
             <a:r>
-              <a:rPr lang="fr-FR" smtClean="0"/>
+              <a:rPr lang="fr-FR"/>
               <a:t>Deuxième niveau</a:t>
             </a:r>
           </a:p>
           <a:p>
             <a:pPr lvl="2"/>
             <a:r>
-              <a:rPr lang="fr-FR" smtClean="0"/>
+              <a:rPr lang="fr-FR"/>
               <a:t>Troisième niveau</a:t>
             </a:r>
           </a:p>
           <a:p>
             <a:pPr lvl="3"/>
             <a:r>
-              <a:rPr lang="fr-FR" smtClean="0"/>
+              <a:rPr lang="fr-FR"/>
               <a:t>Quatrième niveau</a:t>
             </a:r>
           </a:p>
           <a:p>
             <a:pPr lvl="4"/>
             <a:r>
-              <a:rPr lang="fr-FR" smtClean="0"/>
+              <a:rPr lang="fr-FR"/>
               <a:t>Cinquième niveau</a:t>
             </a:r>
-            <a:endParaRPr lang="fr-FR"/>
           </a:p>
         </p:txBody>
       </p:sp>
@@ -1198,38 +1191,37 @@
           <a:p>
             <a:pPr lvl="0"/>
             <a:r>
-              <a:rPr lang="fr-FR" smtClean="0"/>
+              <a:rPr lang="fr-FR"/>
               <a:t>Modifiez les styles du texte du masque</a:t>
             </a:r>
           </a:p>
           <a:p>
             <a:pPr lvl="1"/>
             <a:r>
-              <a:rPr lang="fr-FR" smtClean="0"/>
+              <a:rPr lang="fr-FR"/>
               <a:t>Deuxième niveau</a:t>
             </a:r>
           </a:p>
           <a:p>
             <a:pPr lvl="2"/>
             <a:r>
-              <a:rPr lang="fr-FR" smtClean="0"/>
+              <a:rPr lang="fr-FR"/>
               <a:t>Troisième niveau</a:t>
             </a:r>
           </a:p>
           <a:p>
             <a:pPr lvl="3"/>
             <a:r>
-              <a:rPr lang="fr-FR" smtClean="0"/>
+              <a:rPr lang="fr-FR"/>
               <a:t>Quatrième niveau</a:t>
             </a:r>
           </a:p>
           <a:p>
             <a:pPr lvl="4"/>
             <a:r>
-              <a:rPr lang="fr-FR" smtClean="0"/>
+              <a:rPr lang="fr-FR"/>
               <a:t>Cinquième niveau</a:t>
             </a:r>
-            <a:endParaRPr lang="fr-FR"/>
           </a:p>
         </p:txBody>
       </p:sp>
@@ -1250,7 +1242,7 @@
           <a:p>
             <a:fld id="{951B5795-1CCE-4E86-9492-57076AD25B1D}" type="datetimeFigureOut">
               <a:rPr lang="fr-FR" smtClean="0"/>
-              <a:t>08/12/2017</a:t>
+              <a:t>12/01/2018</a:t>
             </a:fld>
             <a:endParaRPr lang="fr-FR"/>
           </a:p>
@@ -1349,10 +1341,9 @@
           <a:lstStyle/>
           <a:p>
             <a:r>
-              <a:rPr lang="fr-FR" smtClean="0"/>
+              <a:rPr lang="fr-FR"/>
               <a:t>Modifiez le style du titre</a:t>
             </a:r>
-            <a:endParaRPr lang="fr-FR"/>
           </a:p>
         </p:txBody>
       </p:sp>
@@ -1415,7 +1406,7 @@
           <a:p>
             <a:pPr lvl="0"/>
             <a:r>
-              <a:rPr lang="fr-FR" smtClean="0"/>
+              <a:rPr lang="fr-FR"/>
               <a:t>Modifiez les styles du texte du masque</a:t>
             </a:r>
           </a:p>
@@ -1443,38 +1434,37 @@
           <a:p>
             <a:pPr lvl="0"/>
             <a:r>
-              <a:rPr lang="fr-FR" smtClean="0"/>
+              <a:rPr lang="fr-FR"/>
               <a:t>Modifiez les styles du texte du masque</a:t>
             </a:r>
           </a:p>
           <a:p>
             <a:pPr lvl="1"/>
             <a:r>
-              <a:rPr lang="fr-FR" smtClean="0"/>
+              <a:rPr lang="fr-FR"/>
               <a:t>Deuxième niveau</a:t>
             </a:r>
           </a:p>
           <a:p>
             <a:pPr lvl="2"/>
             <a:r>
-              <a:rPr lang="fr-FR" smtClean="0"/>
+              <a:rPr lang="fr-FR"/>
               <a:t>Troisième niveau</a:t>
             </a:r>
           </a:p>
           <a:p>
             <a:pPr lvl="3"/>
             <a:r>
-              <a:rPr lang="fr-FR" smtClean="0"/>
+              <a:rPr lang="fr-FR"/>
               <a:t>Quatrième niveau</a:t>
             </a:r>
           </a:p>
           <a:p>
             <a:pPr lvl="4"/>
             <a:r>
-              <a:rPr lang="fr-FR" smtClean="0"/>
+              <a:rPr lang="fr-FR"/>
               <a:t>Cinquième niveau</a:t>
             </a:r>
-            <a:endParaRPr lang="fr-FR"/>
           </a:p>
         </p:txBody>
       </p:sp>
@@ -1537,7 +1527,7 @@
           <a:p>
             <a:pPr lvl="0"/>
             <a:r>
-              <a:rPr lang="fr-FR" smtClean="0"/>
+              <a:rPr lang="fr-FR"/>
               <a:t>Modifiez les styles du texte du masque</a:t>
             </a:r>
           </a:p>
@@ -1565,38 +1555,37 @@
           <a:p>
             <a:pPr lvl="0"/>
             <a:r>
-              <a:rPr lang="fr-FR" smtClean="0"/>
+              <a:rPr lang="fr-FR"/>
               <a:t>Modifiez les styles du texte du masque</a:t>
             </a:r>
           </a:p>
           <a:p>
             <a:pPr lvl="1"/>
             <a:r>
-              <a:rPr lang="fr-FR" smtClean="0"/>
+              <a:rPr lang="fr-FR"/>
               <a:t>Deuxième niveau</a:t>
             </a:r>
           </a:p>
           <a:p>
             <a:pPr lvl="2"/>
             <a:r>
-              <a:rPr lang="fr-FR" smtClean="0"/>
+              <a:rPr lang="fr-FR"/>
               <a:t>Troisième niveau</a:t>
             </a:r>
           </a:p>
           <a:p>
             <a:pPr lvl="3"/>
             <a:r>
-              <a:rPr lang="fr-FR" smtClean="0"/>
+              <a:rPr lang="fr-FR"/>
               <a:t>Quatrième niveau</a:t>
             </a:r>
           </a:p>
           <a:p>
             <a:pPr lvl="4"/>
             <a:r>
-              <a:rPr lang="fr-FR" smtClean="0"/>
+              <a:rPr lang="fr-FR"/>
               <a:t>Cinquième niveau</a:t>
             </a:r>
-            <a:endParaRPr lang="fr-FR"/>
           </a:p>
         </p:txBody>
       </p:sp>
@@ -1617,7 +1606,7 @@
           <a:p>
             <a:fld id="{951B5795-1CCE-4E86-9492-57076AD25B1D}" type="datetimeFigureOut">
               <a:rPr lang="fr-FR" smtClean="0"/>
-              <a:t>08/12/2017</a:t>
+              <a:t>12/01/2018</a:t>
             </a:fld>
             <a:endParaRPr lang="fr-FR"/>
           </a:p>
@@ -1711,10 +1700,9 @@
           <a:lstStyle/>
           <a:p>
             <a:r>
-              <a:rPr lang="fr-FR" smtClean="0"/>
+              <a:rPr lang="fr-FR"/>
               <a:t>Modifiez le style du titre</a:t>
             </a:r>
-            <a:endParaRPr lang="fr-FR"/>
           </a:p>
         </p:txBody>
       </p:sp>
@@ -1735,7 +1723,7 @@
           <a:p>
             <a:fld id="{951B5795-1CCE-4E86-9492-57076AD25B1D}" type="datetimeFigureOut">
               <a:rPr lang="fr-FR" smtClean="0"/>
-              <a:t>08/12/2017</a:t>
+              <a:t>12/01/2018</a:t>
             </a:fld>
             <a:endParaRPr lang="fr-FR"/>
           </a:p>
@@ -1830,7 +1818,7 @@
           <a:p>
             <a:fld id="{951B5795-1CCE-4E86-9492-57076AD25B1D}" type="datetimeFigureOut">
               <a:rPr lang="fr-FR" smtClean="0"/>
-              <a:t>08/12/2017</a:t>
+              <a:t>12/01/2018</a:t>
             </a:fld>
             <a:endParaRPr lang="fr-FR"/>
           </a:p>
@@ -1933,10 +1921,9 @@
           </a:lstStyle>
           <a:p>
             <a:r>
-              <a:rPr lang="fr-FR" smtClean="0"/>
+              <a:rPr lang="fr-FR"/>
               <a:t>Modifiez le style du titre</a:t>
             </a:r>
-            <a:endParaRPr lang="fr-FR"/>
           </a:p>
         </p:txBody>
       </p:sp>
@@ -1990,38 +1977,37 @@
           <a:p>
             <a:pPr lvl="0"/>
             <a:r>
-              <a:rPr lang="fr-FR" smtClean="0"/>
+              <a:rPr lang="fr-FR"/>
               <a:t>Modifiez les styles du texte du masque</a:t>
             </a:r>
           </a:p>
           <a:p>
             <a:pPr lvl="1"/>
             <a:r>
-              <a:rPr lang="fr-FR" smtClean="0"/>
+              <a:rPr lang="fr-FR"/>
               <a:t>Deuxième niveau</a:t>
             </a:r>
           </a:p>
           <a:p>
             <a:pPr lvl="2"/>
             <a:r>
-              <a:rPr lang="fr-FR" smtClean="0"/>
+              <a:rPr lang="fr-FR"/>
               <a:t>Troisième niveau</a:t>
             </a:r>
           </a:p>
           <a:p>
             <a:pPr lvl="3"/>
             <a:r>
-              <a:rPr lang="fr-FR" smtClean="0"/>
+              <a:rPr lang="fr-FR"/>
               <a:t>Quatrième niveau</a:t>
             </a:r>
           </a:p>
           <a:p>
             <a:pPr lvl="4"/>
             <a:r>
-              <a:rPr lang="fr-FR" smtClean="0"/>
+              <a:rPr lang="fr-FR"/>
               <a:t>Cinquième niveau</a:t>
             </a:r>
-            <a:endParaRPr lang="fr-FR"/>
           </a:p>
         </p:txBody>
       </p:sp>
@@ -2084,7 +2070,7 @@
           <a:p>
             <a:pPr lvl="0"/>
             <a:r>
-              <a:rPr lang="fr-FR" smtClean="0"/>
+              <a:rPr lang="fr-FR"/>
               <a:t>Modifiez les styles du texte du masque</a:t>
             </a:r>
           </a:p>
@@ -2107,7 +2093,7 @@
           <a:p>
             <a:fld id="{951B5795-1CCE-4E86-9492-57076AD25B1D}" type="datetimeFigureOut">
               <a:rPr lang="fr-FR" smtClean="0"/>
-              <a:t>08/12/2017</a:t>
+              <a:t>12/01/2018</a:t>
             </a:fld>
             <a:endParaRPr lang="fr-FR"/>
           </a:p>
@@ -2210,10 +2196,9 @@
           </a:lstStyle>
           <a:p>
             <a:r>
-              <a:rPr lang="fr-FR" smtClean="0"/>
+              <a:rPr lang="fr-FR"/>
               <a:t>Modifiez le style du titre</a:t>
             </a:r>
-            <a:endParaRPr lang="fr-FR"/>
           </a:p>
         </p:txBody>
       </p:sp>
@@ -2337,7 +2322,7 @@
           <a:p>
             <a:pPr lvl="0"/>
             <a:r>
-              <a:rPr lang="fr-FR" smtClean="0"/>
+              <a:rPr lang="fr-FR"/>
               <a:t>Modifiez les styles du texte du masque</a:t>
             </a:r>
           </a:p>
@@ -2360,7 +2345,7 @@
           <a:p>
             <a:fld id="{951B5795-1CCE-4E86-9492-57076AD25B1D}" type="datetimeFigureOut">
               <a:rPr lang="fr-FR" smtClean="0"/>
-              <a:t>08/12/2017</a:t>
+              <a:t>12/01/2018</a:t>
             </a:fld>
             <a:endParaRPr lang="fr-FR"/>
           </a:p>
@@ -2469,10 +2454,9 @@
           <a:lstStyle/>
           <a:p>
             <a:r>
-              <a:rPr lang="fr-FR" smtClean="0"/>
+              <a:rPr lang="fr-FR"/>
               <a:t>Modifiez le style du titre</a:t>
             </a:r>
-            <a:endParaRPr lang="fr-FR"/>
           </a:p>
         </p:txBody>
       </p:sp>
@@ -2503,38 +2487,37 @@
           <a:p>
             <a:pPr lvl="0"/>
             <a:r>
-              <a:rPr lang="fr-FR" smtClean="0"/>
+              <a:rPr lang="fr-FR"/>
               <a:t>Modifiez les styles du texte du masque</a:t>
             </a:r>
           </a:p>
           <a:p>
             <a:pPr lvl="1"/>
             <a:r>
-              <a:rPr lang="fr-FR" smtClean="0"/>
+              <a:rPr lang="fr-FR"/>
               <a:t>Deuxième niveau</a:t>
             </a:r>
           </a:p>
           <a:p>
             <a:pPr lvl="2"/>
             <a:r>
-              <a:rPr lang="fr-FR" smtClean="0"/>
+              <a:rPr lang="fr-FR"/>
               <a:t>Troisième niveau</a:t>
             </a:r>
           </a:p>
           <a:p>
             <a:pPr lvl="3"/>
             <a:r>
-              <a:rPr lang="fr-FR" smtClean="0"/>
+              <a:rPr lang="fr-FR"/>
               <a:t>Quatrième niveau</a:t>
             </a:r>
           </a:p>
           <a:p>
             <a:pPr lvl="4"/>
             <a:r>
-              <a:rPr lang="fr-FR" smtClean="0"/>
+              <a:rPr lang="fr-FR"/>
               <a:t>Cinquième niveau</a:t>
             </a:r>
-            <a:endParaRPr lang="fr-FR"/>
           </a:p>
         </p:txBody>
       </p:sp>
@@ -2573,7 +2556,7 @@
           <a:p>
             <a:fld id="{951B5795-1CCE-4E86-9492-57076AD25B1D}" type="datetimeFigureOut">
               <a:rPr lang="fr-FR" smtClean="0"/>
-              <a:t>08/12/2017</a:t>
+              <a:t>12/01/2018</a:t>
             </a:fld>
             <a:endParaRPr lang="fr-FR"/>
           </a:p>
@@ -3187,7 +3170,7 @@
           <a:lstStyle/>
           <a:p>
             <a:r>
-              <a:rPr lang="fr-FR" sz="1200" dirty="0" smtClean="0">
+              <a:rPr lang="fr-FR" sz="1200" dirty="0">
                 <a:solidFill>
                   <a:srgbClr val="C00000"/>
                 </a:solidFill>
@@ -3266,7 +3249,7 @@
           <a:lstStyle/>
           <a:p>
             <a:r>
-              <a:rPr lang="fr-FR" sz="1200" dirty="0" smtClean="0">
+              <a:rPr lang="fr-FR" sz="1200" dirty="0">
                 <a:solidFill>
                   <a:srgbClr val="C00000"/>
                 </a:solidFill>
@@ -3420,7 +3403,7 @@
           <a:p>
             <a:pPr algn="ctr"/>
             <a:r>
-              <a:rPr lang="fr-FR" sz="1600" dirty="0" smtClean="0">
+              <a:rPr lang="fr-FR" sz="1600" dirty="0">
                 <a:solidFill>
                   <a:schemeClr val="accent6">
                     <a:lumMod val="50000"/>
@@ -3429,13 +3412,6 @@
               </a:rPr>
               <a:t>Carte Arduino</a:t>
             </a:r>
-            <a:endParaRPr lang="fr-FR" sz="1600" dirty="0">
-              <a:solidFill>
-                <a:schemeClr val="accent6">
-                  <a:lumMod val="50000"/>
-                </a:schemeClr>
-              </a:solidFill>
-            </a:endParaRPr>
           </a:p>
         </p:txBody>
       </p:sp>
@@ -3462,10 +3438,9 @@
           <a:lstStyle/>
           <a:p>
             <a:r>
-              <a:rPr lang="fr-FR" dirty="0" smtClean="0"/>
+              <a:rPr lang="fr-FR" dirty="0"/>
               <a:t>Vue de coté </a:t>
             </a:r>
-            <a:endParaRPr lang="fr-FR" dirty="0"/>
           </a:p>
         </p:txBody>
       </p:sp>
@@ -3711,7 +3686,7 @@
           <a:p>
             <a:pPr algn="ctr"/>
             <a:r>
-              <a:rPr lang="fr-FR" sz="1600" dirty="0" smtClean="0">
+              <a:rPr lang="fr-FR" sz="1600" dirty="0">
                 <a:solidFill>
                   <a:schemeClr val="accent6">
                     <a:lumMod val="50000"/>
@@ -3720,13 +3695,6 @@
               </a:rPr>
               <a:t>Carte Arduino</a:t>
             </a:r>
-            <a:endParaRPr lang="fr-FR" sz="1600" dirty="0">
-              <a:solidFill>
-                <a:schemeClr val="accent6">
-                  <a:lumMod val="50000"/>
-                </a:schemeClr>
-              </a:solidFill>
-            </a:endParaRPr>
           </a:p>
         </p:txBody>
       </p:sp>
@@ -3753,10 +3721,9 @@
           <a:lstStyle/>
           <a:p>
             <a:r>
-              <a:rPr lang="fr-FR" dirty="0" smtClean="0"/>
+              <a:rPr lang="fr-FR" dirty="0"/>
               <a:t>Vue de coté </a:t>
             </a:r>
-            <a:endParaRPr lang="fr-FR" dirty="0"/>
           </a:p>
         </p:txBody>
       </p:sp>
@@ -4091,7 +4058,7 @@
           <a:lstStyle/>
           <a:p>
             <a:r>
-              <a:rPr lang="fr-FR" sz="1200" dirty="0" smtClean="0">
+              <a:rPr lang="fr-FR" sz="1200" dirty="0">
                 <a:solidFill>
                   <a:srgbClr val="C00000"/>
                 </a:solidFill>
@@ -4208,7 +4175,7 @@
           <a:p>
             <a:pPr algn="ctr"/>
             <a:r>
-              <a:rPr lang="fr-FR" sz="1600" dirty="0" smtClean="0">
+              <a:rPr lang="fr-FR" sz="1600" dirty="0">
                 <a:solidFill>
                   <a:schemeClr val="accent6">
                     <a:lumMod val="50000"/>
@@ -4217,13 +4184,6 @@
               </a:rPr>
               <a:t>Carte Arduino</a:t>
             </a:r>
-            <a:endParaRPr lang="fr-FR" sz="1600" dirty="0">
-              <a:solidFill>
-                <a:schemeClr val="accent6">
-                  <a:lumMod val="50000"/>
-                </a:schemeClr>
-              </a:solidFill>
-            </a:endParaRPr>
           </a:p>
         </p:txBody>
       </p:sp>
@@ -4250,10 +4210,9 @@
           <a:lstStyle/>
           <a:p>
             <a:r>
-              <a:rPr lang="fr-FR" dirty="0" smtClean="0"/>
+              <a:rPr lang="fr-FR" dirty="0"/>
               <a:t>Vue de coté </a:t>
             </a:r>
-            <a:endParaRPr lang="fr-FR" dirty="0"/>
           </a:p>
         </p:txBody>
       </p:sp>
@@ -4485,10 +4444,9 @@
           <a:lstStyle/>
           <a:p>
             <a:r>
-              <a:rPr lang="fr-FR" dirty="0" smtClean="0"/>
+              <a:rPr lang="fr-FR" dirty="0"/>
               <a:t>Vue de coté </a:t>
             </a:r>
-            <a:endParaRPr lang="fr-FR" dirty="0"/>
           </a:p>
         </p:txBody>
       </p:sp>
@@ -4685,10 +4643,9 @@
           <a:lstStyle/>
           <a:p>
             <a:r>
-              <a:rPr lang="fr-FR" dirty="0" smtClean="0"/>
+              <a:rPr lang="fr-FR" dirty="0"/>
               <a:t>Vue de dessus</a:t>
             </a:r>
-            <a:endParaRPr lang="fr-FR" dirty="0"/>
           </a:p>
         </p:txBody>
       </p:sp>
@@ -4976,7 +4933,7 @@
           <a:p>
             <a:pPr algn="ctr"/>
             <a:r>
-              <a:rPr lang="fr-FR" sz="1600" dirty="0" smtClean="0">
+              <a:rPr lang="fr-FR" sz="1600" dirty="0">
                 <a:solidFill>
                   <a:schemeClr val="accent6">
                     <a:lumMod val="50000"/>
@@ -4985,13 +4942,6 @@
               </a:rPr>
               <a:t>Carte Arduino</a:t>
             </a:r>
-            <a:endParaRPr lang="fr-FR" sz="1600" dirty="0">
-              <a:solidFill>
-                <a:schemeClr val="accent6">
-                  <a:lumMod val="50000"/>
-                </a:schemeClr>
-              </a:solidFill>
-            </a:endParaRPr>
           </a:p>
         </p:txBody>
       </p:sp>
@@ -5228,10 +5178,9 @@
           <a:lstStyle/>
           <a:p>
             <a:r>
-              <a:rPr lang="fr-FR" dirty="0" smtClean="0"/>
+              <a:rPr lang="fr-FR" dirty="0"/>
               <a:t>Vue de coté </a:t>
             </a:r>
-            <a:endParaRPr lang="fr-FR" dirty="0"/>
           </a:p>
         </p:txBody>
       </p:sp>
@@ -6419,10 +6368,9 @@
           <a:lstStyle/>
           <a:p>
             <a:r>
-              <a:rPr lang="fr-FR" dirty="0" smtClean="0"/>
+              <a:rPr lang="fr-FR" dirty="0"/>
               <a:t>Vue de coté </a:t>
             </a:r>
-            <a:endParaRPr lang="fr-FR" dirty="0"/>
           </a:p>
         </p:txBody>
       </p:sp>
@@ -6990,14 +6938,9 @@
           <a:lstStyle/>
           <a:p>
             <a:r>
-              <a:rPr lang="fr-FR" dirty="0" smtClean="0"/>
-              <a:t>Vue de </a:t>
+              <a:rPr lang="fr-FR" dirty="0"/>
+              <a:t>Vue de dessus</a:t>
             </a:r>
-            <a:r>
-              <a:rPr lang="fr-FR" dirty="0" smtClean="0"/>
-              <a:t>dessus</a:t>
-            </a:r>
-            <a:endParaRPr lang="fr-FR" dirty="0"/>
           </a:p>
         </p:txBody>
       </p:sp>
@@ -7009,7 +6952,7 @@
         </p:nvCxnSpPr>
         <p:spPr>
           <a:xfrm flipH="1" flipV="1">
-            <a:off x="4166179" y="2727881"/>
+            <a:off x="4241955" y="2708831"/>
             <a:ext cx="168" cy="2258788"/>
           </a:xfrm>
           <a:prstGeom prst="line">
@@ -7957,41 +7900,702 @@
           </a:p>
         </p:txBody>
       </p:sp>
-      <p:cxnSp>
-        <p:nvCxnSpPr>
-          <p:cNvPr id="8" name="Connecteur droit 7"/>
-          <p:cNvCxnSpPr/>
-          <p:nvPr/>
-        </p:nvCxnSpPr>
-        <p:spPr>
-          <a:xfrm flipV="1">
-            <a:off x="4271524" y="2640264"/>
-            <a:ext cx="20539" cy="2346405"/>
-          </a:xfrm>
-          <a:prstGeom prst="line">
-            <a:avLst/>
-          </a:prstGeom>
-          <a:ln w="38100">
-            <a:solidFill>
-              <a:schemeClr val="tx1"/>
-            </a:solidFill>
-          </a:ln>
-        </p:spPr>
-        <p:style>
-          <a:lnRef idx="1">
-            <a:schemeClr val="accent1"/>
-          </a:lnRef>
-          <a:fillRef idx="0">
-            <a:schemeClr val="accent1"/>
-          </a:fillRef>
-          <a:effectRef idx="0">
-            <a:schemeClr val="accent1"/>
-          </a:effectRef>
-          <a:fontRef idx="minor">
-            <a:schemeClr val="tx1"/>
-          </a:fontRef>
-        </p:style>
-      </p:cxnSp>
+      <p:sp>
+        <p:nvSpPr>
+          <p:cNvPr id="27" name="Pentagone 19">
+            <a:extLst>
+              <a:ext uri="{FF2B5EF4-FFF2-40B4-BE49-F238E27FC236}">
+                <a16:creationId xmlns:a16="http://schemas.microsoft.com/office/drawing/2014/main" id="{84C84B35-5F0E-4455-B4F8-FE2E45929F43}"/>
+              </a:ext>
+            </a:extLst>
+          </p:cNvPr>
+          <p:cNvSpPr/>
+          <p:nvPr/>
+        </p:nvSpPr>
+        <p:spPr>
+          <a:xfrm rot="10800000">
+            <a:off x="4093256" y="2853078"/>
+            <a:ext cx="218635" cy="106796"/>
+          </a:xfrm>
+          <a:prstGeom prst="homePlate">
+            <a:avLst/>
+          </a:prstGeom>
+          <a:solidFill>
+            <a:schemeClr val="bg2">
+              <a:lumMod val="50000"/>
+            </a:schemeClr>
+          </a:solidFill>
+          <a:ln>
+            <a:solidFill>
+              <a:schemeClr val="bg2">
+                <a:lumMod val="50000"/>
+              </a:schemeClr>
+            </a:solidFill>
+          </a:ln>
+        </p:spPr>
+        <p:style>
+          <a:lnRef idx="2">
+            <a:schemeClr val="accent1">
+              <a:shade val="50000"/>
+            </a:schemeClr>
+          </a:lnRef>
+          <a:fillRef idx="1">
+            <a:schemeClr val="accent1"/>
+          </a:fillRef>
+          <a:effectRef idx="0">
+            <a:schemeClr val="accent1"/>
+          </a:effectRef>
+          <a:fontRef idx="minor">
+            <a:schemeClr val="lt1"/>
+          </a:fontRef>
+        </p:style>
+        <p:txBody>
+          <a:bodyPr rtlCol="0" anchor="ctr"/>
+          <a:lstStyle/>
+          <a:p>
+            <a:pPr algn="ctr"/>
+            <a:endParaRPr lang="fr-FR"/>
+          </a:p>
+        </p:txBody>
+      </p:sp>
+      <p:sp>
+        <p:nvSpPr>
+          <p:cNvPr id="28" name="Pentagone 20">
+            <a:extLst>
+              <a:ext uri="{FF2B5EF4-FFF2-40B4-BE49-F238E27FC236}">
+                <a16:creationId xmlns:a16="http://schemas.microsoft.com/office/drawing/2014/main" id="{4EBF7D1C-A049-4B70-ABFB-F69EDF5C07CB}"/>
+              </a:ext>
+            </a:extLst>
+          </p:cNvPr>
+          <p:cNvSpPr/>
+          <p:nvPr/>
+        </p:nvSpPr>
+        <p:spPr>
+          <a:xfrm rot="10800000">
+            <a:off x="4093257" y="2738732"/>
+            <a:ext cx="218635" cy="106796"/>
+          </a:xfrm>
+          <a:prstGeom prst="homePlate">
+            <a:avLst/>
+          </a:prstGeom>
+          <a:solidFill>
+            <a:schemeClr val="bg2">
+              <a:lumMod val="50000"/>
+            </a:schemeClr>
+          </a:solidFill>
+          <a:ln>
+            <a:solidFill>
+              <a:schemeClr val="bg2">
+                <a:lumMod val="50000"/>
+              </a:schemeClr>
+            </a:solidFill>
+          </a:ln>
+        </p:spPr>
+        <p:style>
+          <a:lnRef idx="2">
+            <a:schemeClr val="accent1">
+              <a:shade val="50000"/>
+            </a:schemeClr>
+          </a:lnRef>
+          <a:fillRef idx="1">
+            <a:schemeClr val="accent1"/>
+          </a:fillRef>
+          <a:effectRef idx="0">
+            <a:schemeClr val="accent1"/>
+          </a:effectRef>
+          <a:fontRef idx="minor">
+            <a:schemeClr val="lt1"/>
+          </a:fontRef>
+        </p:style>
+        <p:txBody>
+          <a:bodyPr rtlCol="0" anchor="ctr"/>
+          <a:lstStyle/>
+          <a:p>
+            <a:pPr algn="ctr"/>
+            <a:endParaRPr lang="fr-FR"/>
+          </a:p>
+        </p:txBody>
+      </p:sp>
+      <p:sp>
+        <p:nvSpPr>
+          <p:cNvPr id="29" name="Pentagone 22">
+            <a:extLst>
+              <a:ext uri="{FF2B5EF4-FFF2-40B4-BE49-F238E27FC236}">
+                <a16:creationId xmlns:a16="http://schemas.microsoft.com/office/drawing/2014/main" id="{723FAE96-6F26-420C-A162-118CD6398E05}"/>
+              </a:ext>
+            </a:extLst>
+          </p:cNvPr>
+          <p:cNvSpPr/>
+          <p:nvPr/>
+        </p:nvSpPr>
+        <p:spPr>
+          <a:xfrm rot="10800000">
+            <a:off x="4093255" y="2966915"/>
+            <a:ext cx="218635" cy="106796"/>
+          </a:xfrm>
+          <a:prstGeom prst="homePlate">
+            <a:avLst/>
+          </a:prstGeom>
+          <a:solidFill>
+            <a:schemeClr val="bg2">
+              <a:lumMod val="50000"/>
+            </a:schemeClr>
+          </a:solidFill>
+          <a:ln>
+            <a:solidFill>
+              <a:schemeClr val="bg2">
+                <a:lumMod val="50000"/>
+              </a:schemeClr>
+            </a:solidFill>
+          </a:ln>
+        </p:spPr>
+        <p:style>
+          <a:lnRef idx="2">
+            <a:schemeClr val="accent1">
+              <a:shade val="50000"/>
+            </a:schemeClr>
+          </a:lnRef>
+          <a:fillRef idx="1">
+            <a:schemeClr val="accent1"/>
+          </a:fillRef>
+          <a:effectRef idx="0">
+            <a:schemeClr val="accent1"/>
+          </a:effectRef>
+          <a:fontRef idx="minor">
+            <a:schemeClr val="lt1"/>
+          </a:fontRef>
+        </p:style>
+        <p:txBody>
+          <a:bodyPr rtlCol="0" anchor="ctr"/>
+          <a:lstStyle/>
+          <a:p>
+            <a:pPr algn="ctr"/>
+            <a:endParaRPr lang="fr-FR"/>
+          </a:p>
+        </p:txBody>
+      </p:sp>
+      <p:sp>
+        <p:nvSpPr>
+          <p:cNvPr id="30" name="Pentagone 49">
+            <a:extLst>
+              <a:ext uri="{FF2B5EF4-FFF2-40B4-BE49-F238E27FC236}">
+                <a16:creationId xmlns:a16="http://schemas.microsoft.com/office/drawing/2014/main" id="{BEFC9DBB-DBBB-4344-94B9-BEDD2D842DA8}"/>
+              </a:ext>
+            </a:extLst>
+          </p:cNvPr>
+          <p:cNvSpPr/>
+          <p:nvPr/>
+        </p:nvSpPr>
+        <p:spPr>
+          <a:xfrm rot="10800000">
+            <a:off x="4093255" y="3188602"/>
+            <a:ext cx="218635" cy="106796"/>
+          </a:xfrm>
+          <a:prstGeom prst="homePlate">
+            <a:avLst/>
+          </a:prstGeom>
+          <a:solidFill>
+            <a:schemeClr val="bg2">
+              <a:lumMod val="50000"/>
+            </a:schemeClr>
+          </a:solidFill>
+          <a:ln>
+            <a:solidFill>
+              <a:schemeClr val="bg2">
+                <a:lumMod val="50000"/>
+              </a:schemeClr>
+            </a:solidFill>
+          </a:ln>
+        </p:spPr>
+        <p:style>
+          <a:lnRef idx="2">
+            <a:schemeClr val="accent1">
+              <a:shade val="50000"/>
+            </a:schemeClr>
+          </a:lnRef>
+          <a:fillRef idx="1">
+            <a:schemeClr val="accent1"/>
+          </a:fillRef>
+          <a:effectRef idx="0">
+            <a:schemeClr val="accent1"/>
+          </a:effectRef>
+          <a:fontRef idx="minor">
+            <a:schemeClr val="lt1"/>
+          </a:fontRef>
+        </p:style>
+        <p:txBody>
+          <a:bodyPr rtlCol="0" anchor="ctr"/>
+          <a:lstStyle/>
+          <a:p>
+            <a:pPr algn="ctr"/>
+            <a:endParaRPr lang="fr-FR"/>
+          </a:p>
+        </p:txBody>
+      </p:sp>
+      <p:sp>
+        <p:nvSpPr>
+          <p:cNvPr id="31" name="Pentagone 50">
+            <a:extLst>
+              <a:ext uri="{FF2B5EF4-FFF2-40B4-BE49-F238E27FC236}">
+                <a16:creationId xmlns:a16="http://schemas.microsoft.com/office/drawing/2014/main" id="{5F6373FD-6F8C-4AA4-8CFE-B76CA4BDA0E7}"/>
+              </a:ext>
+            </a:extLst>
+          </p:cNvPr>
+          <p:cNvSpPr/>
+          <p:nvPr/>
+        </p:nvSpPr>
+        <p:spPr>
+          <a:xfrm rot="10800000">
+            <a:off x="4093256" y="3074256"/>
+            <a:ext cx="218635" cy="106796"/>
+          </a:xfrm>
+          <a:prstGeom prst="homePlate">
+            <a:avLst/>
+          </a:prstGeom>
+          <a:solidFill>
+            <a:schemeClr val="bg2">
+              <a:lumMod val="50000"/>
+            </a:schemeClr>
+          </a:solidFill>
+          <a:ln>
+            <a:solidFill>
+              <a:schemeClr val="bg2">
+                <a:lumMod val="50000"/>
+              </a:schemeClr>
+            </a:solidFill>
+          </a:ln>
+        </p:spPr>
+        <p:style>
+          <a:lnRef idx="2">
+            <a:schemeClr val="accent1">
+              <a:shade val="50000"/>
+            </a:schemeClr>
+          </a:lnRef>
+          <a:fillRef idx="1">
+            <a:schemeClr val="accent1"/>
+          </a:fillRef>
+          <a:effectRef idx="0">
+            <a:schemeClr val="accent1"/>
+          </a:effectRef>
+          <a:fontRef idx="minor">
+            <a:schemeClr val="lt1"/>
+          </a:fontRef>
+        </p:style>
+        <p:txBody>
+          <a:bodyPr rtlCol="0" anchor="ctr"/>
+          <a:lstStyle/>
+          <a:p>
+            <a:pPr algn="ctr"/>
+            <a:endParaRPr lang="fr-FR"/>
+          </a:p>
+        </p:txBody>
+      </p:sp>
+      <p:sp>
+        <p:nvSpPr>
+          <p:cNvPr id="32" name="Pentagone 51">
+            <a:extLst>
+              <a:ext uri="{FF2B5EF4-FFF2-40B4-BE49-F238E27FC236}">
+                <a16:creationId xmlns:a16="http://schemas.microsoft.com/office/drawing/2014/main" id="{CE947A7B-D4EC-4C3D-81EC-91E0F9FA73B3}"/>
+              </a:ext>
+            </a:extLst>
+          </p:cNvPr>
+          <p:cNvSpPr/>
+          <p:nvPr/>
+        </p:nvSpPr>
+        <p:spPr>
+          <a:xfrm rot="10800000">
+            <a:off x="4093254" y="3302439"/>
+            <a:ext cx="218635" cy="106796"/>
+          </a:xfrm>
+          <a:prstGeom prst="homePlate">
+            <a:avLst/>
+          </a:prstGeom>
+          <a:solidFill>
+            <a:schemeClr val="bg2">
+              <a:lumMod val="50000"/>
+            </a:schemeClr>
+          </a:solidFill>
+          <a:ln>
+            <a:solidFill>
+              <a:schemeClr val="bg2">
+                <a:lumMod val="50000"/>
+              </a:schemeClr>
+            </a:solidFill>
+          </a:ln>
+        </p:spPr>
+        <p:style>
+          <a:lnRef idx="2">
+            <a:schemeClr val="accent1">
+              <a:shade val="50000"/>
+            </a:schemeClr>
+          </a:lnRef>
+          <a:fillRef idx="1">
+            <a:schemeClr val="accent1"/>
+          </a:fillRef>
+          <a:effectRef idx="0">
+            <a:schemeClr val="accent1"/>
+          </a:effectRef>
+          <a:fontRef idx="minor">
+            <a:schemeClr val="lt1"/>
+          </a:fontRef>
+        </p:style>
+        <p:txBody>
+          <a:bodyPr rtlCol="0" anchor="ctr"/>
+          <a:lstStyle/>
+          <a:p>
+            <a:pPr algn="ctr"/>
+            <a:endParaRPr lang="fr-FR"/>
+          </a:p>
+        </p:txBody>
+      </p:sp>
+      <p:sp>
+        <p:nvSpPr>
+          <p:cNvPr id="37" name="Pentagone 52">
+            <a:extLst>
+              <a:ext uri="{FF2B5EF4-FFF2-40B4-BE49-F238E27FC236}">
+                <a16:creationId xmlns:a16="http://schemas.microsoft.com/office/drawing/2014/main" id="{F56C245A-F3C6-49AB-9220-EB45494AD409}"/>
+              </a:ext>
+            </a:extLst>
+          </p:cNvPr>
+          <p:cNvSpPr/>
+          <p:nvPr/>
+        </p:nvSpPr>
+        <p:spPr>
+          <a:xfrm rot="10800000">
+            <a:off x="4093255" y="3529301"/>
+            <a:ext cx="218635" cy="106796"/>
+          </a:xfrm>
+          <a:prstGeom prst="homePlate">
+            <a:avLst/>
+          </a:prstGeom>
+          <a:solidFill>
+            <a:schemeClr val="bg2">
+              <a:lumMod val="50000"/>
+            </a:schemeClr>
+          </a:solidFill>
+          <a:ln>
+            <a:solidFill>
+              <a:schemeClr val="bg2">
+                <a:lumMod val="50000"/>
+              </a:schemeClr>
+            </a:solidFill>
+          </a:ln>
+        </p:spPr>
+        <p:style>
+          <a:lnRef idx="2">
+            <a:schemeClr val="accent1">
+              <a:shade val="50000"/>
+            </a:schemeClr>
+          </a:lnRef>
+          <a:fillRef idx="1">
+            <a:schemeClr val="accent1"/>
+          </a:fillRef>
+          <a:effectRef idx="0">
+            <a:schemeClr val="accent1"/>
+          </a:effectRef>
+          <a:fontRef idx="minor">
+            <a:schemeClr val="lt1"/>
+          </a:fontRef>
+        </p:style>
+        <p:txBody>
+          <a:bodyPr rtlCol="0" anchor="ctr"/>
+          <a:lstStyle/>
+          <a:p>
+            <a:pPr algn="ctr"/>
+            <a:endParaRPr lang="fr-FR"/>
+          </a:p>
+        </p:txBody>
+      </p:sp>
+      <p:sp>
+        <p:nvSpPr>
+          <p:cNvPr id="38" name="Pentagone 53">
+            <a:extLst>
+              <a:ext uri="{FF2B5EF4-FFF2-40B4-BE49-F238E27FC236}">
+                <a16:creationId xmlns:a16="http://schemas.microsoft.com/office/drawing/2014/main" id="{854CC3F4-B0E6-41D8-A37E-EC421D473AA9}"/>
+              </a:ext>
+            </a:extLst>
+          </p:cNvPr>
+          <p:cNvSpPr/>
+          <p:nvPr/>
+        </p:nvSpPr>
+        <p:spPr>
+          <a:xfrm rot="10800000">
+            <a:off x="4093256" y="3414955"/>
+            <a:ext cx="218635" cy="106796"/>
+          </a:xfrm>
+          <a:prstGeom prst="homePlate">
+            <a:avLst/>
+          </a:prstGeom>
+          <a:solidFill>
+            <a:schemeClr val="bg2">
+              <a:lumMod val="50000"/>
+            </a:schemeClr>
+          </a:solidFill>
+          <a:ln>
+            <a:solidFill>
+              <a:schemeClr val="bg2">
+                <a:lumMod val="50000"/>
+              </a:schemeClr>
+            </a:solidFill>
+          </a:ln>
+        </p:spPr>
+        <p:style>
+          <a:lnRef idx="2">
+            <a:schemeClr val="accent1">
+              <a:shade val="50000"/>
+            </a:schemeClr>
+          </a:lnRef>
+          <a:fillRef idx="1">
+            <a:schemeClr val="accent1"/>
+          </a:fillRef>
+          <a:effectRef idx="0">
+            <a:schemeClr val="accent1"/>
+          </a:effectRef>
+          <a:fontRef idx="minor">
+            <a:schemeClr val="lt1"/>
+          </a:fontRef>
+        </p:style>
+        <p:txBody>
+          <a:bodyPr rtlCol="0" anchor="ctr"/>
+          <a:lstStyle/>
+          <a:p>
+            <a:pPr algn="ctr"/>
+            <a:endParaRPr lang="fr-FR"/>
+          </a:p>
+        </p:txBody>
+      </p:sp>
+      <p:sp>
+        <p:nvSpPr>
+          <p:cNvPr id="39" name="Pentagone 54">
+            <a:extLst>
+              <a:ext uri="{FF2B5EF4-FFF2-40B4-BE49-F238E27FC236}">
+                <a16:creationId xmlns:a16="http://schemas.microsoft.com/office/drawing/2014/main" id="{12072D05-30C4-4421-86C1-6044A4607600}"/>
+              </a:ext>
+            </a:extLst>
+          </p:cNvPr>
+          <p:cNvSpPr/>
+          <p:nvPr/>
+        </p:nvSpPr>
+        <p:spPr>
+          <a:xfrm rot="10800000">
+            <a:off x="4093254" y="3643138"/>
+            <a:ext cx="218635" cy="106796"/>
+          </a:xfrm>
+          <a:prstGeom prst="homePlate">
+            <a:avLst/>
+          </a:prstGeom>
+          <a:solidFill>
+            <a:schemeClr val="bg2">
+              <a:lumMod val="50000"/>
+            </a:schemeClr>
+          </a:solidFill>
+          <a:ln>
+            <a:solidFill>
+              <a:schemeClr val="bg2">
+                <a:lumMod val="50000"/>
+              </a:schemeClr>
+            </a:solidFill>
+          </a:ln>
+        </p:spPr>
+        <p:style>
+          <a:lnRef idx="2">
+            <a:schemeClr val="accent1">
+              <a:shade val="50000"/>
+            </a:schemeClr>
+          </a:lnRef>
+          <a:fillRef idx="1">
+            <a:schemeClr val="accent1"/>
+          </a:fillRef>
+          <a:effectRef idx="0">
+            <a:schemeClr val="accent1"/>
+          </a:effectRef>
+          <a:fontRef idx="minor">
+            <a:schemeClr val="lt1"/>
+          </a:fontRef>
+        </p:style>
+        <p:txBody>
+          <a:bodyPr rtlCol="0" anchor="ctr"/>
+          <a:lstStyle/>
+          <a:p>
+            <a:pPr algn="ctr"/>
+            <a:endParaRPr lang="fr-FR"/>
+          </a:p>
+        </p:txBody>
+      </p:sp>
+      <p:sp>
+        <p:nvSpPr>
+          <p:cNvPr id="40" name="Pentagone 55">
+            <a:extLst>
+              <a:ext uri="{FF2B5EF4-FFF2-40B4-BE49-F238E27FC236}">
+                <a16:creationId xmlns:a16="http://schemas.microsoft.com/office/drawing/2014/main" id="{A29B5F03-51FE-4A2B-8AD3-5329437571A1}"/>
+              </a:ext>
+            </a:extLst>
+          </p:cNvPr>
+          <p:cNvSpPr/>
+          <p:nvPr/>
+        </p:nvSpPr>
+        <p:spPr>
+          <a:xfrm rot="10800000">
+            <a:off x="4093254" y="3864825"/>
+            <a:ext cx="218635" cy="106796"/>
+          </a:xfrm>
+          <a:prstGeom prst="homePlate">
+            <a:avLst/>
+          </a:prstGeom>
+          <a:solidFill>
+            <a:schemeClr val="bg2">
+              <a:lumMod val="50000"/>
+            </a:schemeClr>
+          </a:solidFill>
+          <a:ln>
+            <a:solidFill>
+              <a:schemeClr val="bg2">
+                <a:lumMod val="50000"/>
+              </a:schemeClr>
+            </a:solidFill>
+          </a:ln>
+        </p:spPr>
+        <p:style>
+          <a:lnRef idx="2">
+            <a:schemeClr val="accent1">
+              <a:shade val="50000"/>
+            </a:schemeClr>
+          </a:lnRef>
+          <a:fillRef idx="1">
+            <a:schemeClr val="accent1"/>
+          </a:fillRef>
+          <a:effectRef idx="0">
+            <a:schemeClr val="accent1"/>
+          </a:effectRef>
+          <a:fontRef idx="minor">
+            <a:schemeClr val="lt1"/>
+          </a:fontRef>
+        </p:style>
+        <p:txBody>
+          <a:bodyPr rtlCol="0" anchor="ctr"/>
+          <a:lstStyle/>
+          <a:p>
+            <a:pPr algn="ctr"/>
+            <a:endParaRPr lang="fr-FR"/>
+          </a:p>
+        </p:txBody>
+      </p:sp>
+      <p:sp>
+        <p:nvSpPr>
+          <p:cNvPr id="41" name="Pentagone 56">
+            <a:extLst>
+              <a:ext uri="{FF2B5EF4-FFF2-40B4-BE49-F238E27FC236}">
+                <a16:creationId xmlns:a16="http://schemas.microsoft.com/office/drawing/2014/main" id="{BC199668-9680-47A3-8F9E-6B5A6D69242D}"/>
+              </a:ext>
+            </a:extLst>
+          </p:cNvPr>
+          <p:cNvSpPr/>
+          <p:nvPr/>
+        </p:nvSpPr>
+        <p:spPr>
+          <a:xfrm rot="10800000">
+            <a:off x="4093255" y="3750479"/>
+            <a:ext cx="218635" cy="106796"/>
+          </a:xfrm>
+          <a:prstGeom prst="homePlate">
+            <a:avLst/>
+          </a:prstGeom>
+          <a:solidFill>
+            <a:schemeClr val="bg2">
+              <a:lumMod val="50000"/>
+            </a:schemeClr>
+          </a:solidFill>
+          <a:ln>
+            <a:solidFill>
+              <a:schemeClr val="bg2">
+                <a:lumMod val="50000"/>
+              </a:schemeClr>
+            </a:solidFill>
+          </a:ln>
+        </p:spPr>
+        <p:style>
+          <a:lnRef idx="2">
+            <a:schemeClr val="accent1">
+              <a:shade val="50000"/>
+            </a:schemeClr>
+          </a:lnRef>
+          <a:fillRef idx="1">
+            <a:schemeClr val="accent1"/>
+          </a:fillRef>
+          <a:effectRef idx="0">
+            <a:schemeClr val="accent1"/>
+          </a:effectRef>
+          <a:fontRef idx="minor">
+            <a:schemeClr val="lt1"/>
+          </a:fontRef>
+        </p:style>
+        <p:txBody>
+          <a:bodyPr rtlCol="0" anchor="ctr"/>
+          <a:lstStyle/>
+          <a:p>
+            <a:pPr algn="ctr"/>
+            <a:endParaRPr lang="fr-FR"/>
+          </a:p>
+        </p:txBody>
+      </p:sp>
+      <p:sp>
+        <p:nvSpPr>
+          <p:cNvPr id="42" name="Pentagone 57">
+            <a:extLst>
+              <a:ext uri="{FF2B5EF4-FFF2-40B4-BE49-F238E27FC236}">
+                <a16:creationId xmlns:a16="http://schemas.microsoft.com/office/drawing/2014/main" id="{F773A9BE-FFFC-4035-AAA9-EFB405EE3EB7}"/>
+              </a:ext>
+            </a:extLst>
+          </p:cNvPr>
+          <p:cNvSpPr/>
+          <p:nvPr/>
+        </p:nvSpPr>
+        <p:spPr>
+          <a:xfrm rot="10800000">
+            <a:off x="4093253" y="3978662"/>
+            <a:ext cx="218635" cy="106796"/>
+          </a:xfrm>
+          <a:prstGeom prst="homePlate">
+            <a:avLst/>
+          </a:prstGeom>
+          <a:solidFill>
+            <a:schemeClr val="bg2">
+              <a:lumMod val="50000"/>
+            </a:schemeClr>
+          </a:solidFill>
+          <a:ln>
+            <a:solidFill>
+              <a:schemeClr val="bg2">
+                <a:lumMod val="50000"/>
+              </a:schemeClr>
+            </a:solidFill>
+          </a:ln>
+        </p:spPr>
+        <p:style>
+          <a:lnRef idx="2">
+            <a:schemeClr val="accent1">
+              <a:shade val="50000"/>
+            </a:schemeClr>
+          </a:lnRef>
+          <a:fillRef idx="1">
+            <a:schemeClr val="accent1"/>
+          </a:fillRef>
+          <a:effectRef idx="0">
+            <a:schemeClr val="accent1"/>
+          </a:effectRef>
+          <a:fontRef idx="minor">
+            <a:schemeClr val="lt1"/>
+          </a:fontRef>
+        </p:style>
+        <p:txBody>
+          <a:bodyPr rtlCol="0" anchor="ctr"/>
+          <a:lstStyle/>
+          <a:p>
+            <a:pPr algn="ctr"/>
+            <a:endParaRPr lang="fr-FR"/>
+          </a:p>
+        </p:txBody>
+      </p:sp>
     </p:spTree>
     <p:extLst>
       <p:ext uri="{BB962C8B-B14F-4D97-AF65-F5344CB8AC3E}">
@@ -8185,10 +8789,9 @@
           <a:lstStyle/>
           <a:p>
             <a:r>
-              <a:rPr lang="fr-FR" dirty="0" smtClean="0"/>
+              <a:rPr lang="fr-FR" dirty="0"/>
               <a:t>Vue de coté </a:t>
             </a:r>
-            <a:endParaRPr lang="fr-FR" dirty="0"/>
           </a:p>
         </p:txBody>
       </p:sp>
@@ -9484,7 +10087,7 @@
           <a:lstStyle/>
           <a:p>
             <a:r>
-              <a:rPr lang="fr-FR" sz="1200" dirty="0" smtClean="0">
+              <a:rPr lang="fr-FR" sz="1200" dirty="0">
                 <a:solidFill>
                   <a:srgbClr val="C00000"/>
                 </a:solidFill>
@@ -9601,7 +10204,7 @@
           <a:p>
             <a:pPr algn="ctr"/>
             <a:r>
-              <a:rPr lang="fr-FR" sz="1600" dirty="0" smtClean="0">
+              <a:rPr lang="fr-FR" sz="1600" dirty="0">
                 <a:solidFill>
                   <a:schemeClr val="accent6">
                     <a:lumMod val="50000"/>
@@ -9610,13 +10213,6 @@
               </a:rPr>
               <a:t>Carte Arduino</a:t>
             </a:r>
-            <a:endParaRPr lang="fr-FR" sz="1600" dirty="0">
-              <a:solidFill>
-                <a:schemeClr val="accent6">
-                  <a:lumMod val="50000"/>
-                </a:schemeClr>
-              </a:solidFill>
-            </a:endParaRPr>
           </a:p>
         </p:txBody>
       </p:sp>
@@ -9643,10 +10239,9 @@
           <a:lstStyle/>
           <a:p>
             <a:r>
-              <a:rPr lang="fr-FR" dirty="0" smtClean="0"/>
+              <a:rPr lang="fr-FR" dirty="0"/>
               <a:t>Vue de coté </a:t>
             </a:r>
-            <a:endParaRPr lang="fr-FR" dirty="0"/>
           </a:p>
         </p:txBody>
       </p:sp>

</xml_diff>